<commit_message>
Resto de las presentaciones
</commit_message>
<xml_diff>
--- a/03. Principios SOLID - SRP.pptx
+++ b/03. Principios SOLID - SRP.pptx
@@ -151,7 +151,7 @@
       </p14:sectionLst>
     </p:ext>
     <p:ext uri="{EFAFB233-063F-42B5-8137-9DF3F51BA10A}">
-      <p15:sldGuideLst xmlns="" xmlns:p15="http://schemas.microsoft.com/office/powerpoint/2012/main">
+      <p15:sldGuideLst xmlns:p15="http://schemas.microsoft.com/office/powerpoint/2012/main" xmlns="">
         <p15:guide id="1" orient="horz" pos="2160">
           <p15:clr>
             <a:srgbClr val="A4A3A4"/>
@@ -250,7 +250,7 @@
           <a:p>
             <a:fld id="{1B113009-E86D-4EAD-B57C-C146F81250E7}" type="datetimeFigureOut">
               <a:rPr lang="es-AR" smtClean="0"/>
-              <a:t>23/3/15</a:t>
+              <a:t>3/4/15</a:t>
             </a:fld>
             <a:endParaRPr lang="es-AR"/>
           </a:p>
@@ -417,7 +417,7 @@
           <a:p>
             <a:fld id="{052CBB1C-CCF2-4176-B982-0B59C5DF6987}" type="datetimeFigureOut">
               <a:rPr lang="es-ES"/>
-              <a:t>23/3/15</a:t>
+              <a:t>3/4/15</a:t>
             </a:fld>
             <a:endParaRPr lang="es-ES"/>
           </a:p>
@@ -4043,9 +4043,9 @@
           <a:bodyPr/>
           <a:lstStyle/>
           <a:p>
-            <a:fld id="{E692A91C-B168-CD43-8548-9CA119398382}" type="datetime1">
+            <a:fld id="{2BB37752-FE08-AA4D-A75F-96E62D22D2DC}" type="datetime1">
               <a:rPr lang="es-AR" smtClean="0"/>
-              <a:t>23/3/15</a:t>
+              <a:t>3/4/15</a:t>
             </a:fld>
             <a:endParaRPr lang="es-ES"/>
           </a:p>
@@ -4068,7 +4068,7 @@
           <a:p>
             <a:r>
               <a:rPr lang="es-AR" smtClean="0"/>
-              <a:t>Bases del Diseño de Software - Presentación</a:t>
+              <a:t>Bases del Diseño de Software - SOLID SRP</a:t>
             </a:r>
             <a:endParaRPr lang="es-ES"/>
           </a:p>
@@ -4234,9 +4234,9 @@
           <a:bodyPr/>
           <a:lstStyle/>
           <a:p>
-            <a:fld id="{AB9D71D2-4550-F84D-AF95-F3F1F4F5FCD4}" type="datetime1">
+            <a:fld id="{5D623A25-37FD-0540-94E4-4B6373029EF5}" type="datetime1">
               <a:rPr lang="es-AR" smtClean="0"/>
-              <a:t>23/3/15</a:t>
+              <a:t>3/4/15</a:t>
             </a:fld>
             <a:endParaRPr lang="es-ES"/>
           </a:p>
@@ -4259,7 +4259,7 @@
           <a:p>
             <a:r>
               <a:rPr lang="es-AR" smtClean="0"/>
-              <a:t>Bases del Diseño de Software - Presentación</a:t>
+              <a:t>Bases del Diseño de Software - SOLID SRP</a:t>
             </a:r>
             <a:endParaRPr lang="es-ES"/>
           </a:p>
@@ -4395,9 +4395,9 @@
           <a:bodyPr/>
           <a:lstStyle/>
           <a:p>
-            <a:fld id="{147A1E07-97C0-524A-9623-8741475EFC9B}" type="datetime1">
+            <a:fld id="{4A72308F-C987-0140-855B-25899DAD6568}" type="datetime1">
               <a:rPr lang="es-AR" smtClean="0"/>
-              <a:t>23/3/15</a:t>
+              <a:t>3/4/15</a:t>
             </a:fld>
             <a:endParaRPr lang="es-ES"/>
           </a:p>
@@ -4420,7 +4420,7 @@
           <a:p>
             <a:r>
               <a:rPr lang="es-AR" smtClean="0"/>
-              <a:t>Bases del Diseño de Software - Presentación</a:t>
+              <a:t>Bases del Diseño de Software - SOLID SRP</a:t>
             </a:r>
             <a:endParaRPr lang="es-ES"/>
           </a:p>
@@ -6231,9 +6231,9 @@
           <a:bodyPr/>
           <a:lstStyle/>
           <a:p>
-            <a:fld id="{554AD48E-D44B-204A-97D0-5A48ABDBC01B}" type="datetime1">
+            <a:fld id="{26021B3E-B099-D643-8E32-DAA2FA3E85B6}" type="datetime1">
               <a:rPr lang="es-AR" smtClean="0"/>
-              <a:t>23/3/15</a:t>
+              <a:t>3/4/15</a:t>
             </a:fld>
             <a:endParaRPr lang="es-ES"/>
           </a:p>
@@ -6256,7 +6256,7 @@
           <a:p>
             <a:r>
               <a:rPr lang="es-AR" smtClean="0"/>
-              <a:t>Bases del Diseño de Software - Presentación</a:t>
+              <a:t>Bases del Diseño de Software - SOLID SRP</a:t>
             </a:r>
             <a:endParaRPr lang="es-ES"/>
           </a:p>
@@ -8111,9 +8111,9 @@
           <a:bodyPr/>
           <a:lstStyle/>
           <a:p>
-            <a:fld id="{36BEBB8E-63AC-8C4C-9A58-D0AFF5A0F92F}" type="datetime1">
+            <a:fld id="{42361C86-7CC9-FB4B-98C3-AF0A6C57BA2F}" type="datetime1">
               <a:rPr lang="es-AR" smtClean="0"/>
-              <a:t>23/3/15</a:t>
+              <a:t>3/4/15</a:t>
             </a:fld>
             <a:endParaRPr lang="es-ES"/>
           </a:p>
@@ -8136,7 +8136,7 @@
           <a:p>
             <a:r>
               <a:rPr lang="es-AR" smtClean="0"/>
-              <a:t>Bases del Diseño de Software - Presentación</a:t>
+              <a:t>Bases del Diseño de Software - SOLID SRP</a:t>
             </a:r>
             <a:endParaRPr lang="es-ES"/>
           </a:p>
@@ -8234,9 +8234,9 @@
           <a:bodyPr/>
           <a:lstStyle/>
           <a:p>
-            <a:fld id="{E180FFDD-ED13-734E-B029-8EEA2953485E}" type="datetime1">
+            <a:fld id="{D775A29A-158A-E34A-A31A-10C5D6E1AA71}" type="datetime1">
               <a:rPr lang="es-AR" smtClean="0"/>
-              <a:t>23/3/15</a:t>
+              <a:t>3/4/15</a:t>
             </a:fld>
             <a:endParaRPr lang="es-ES"/>
           </a:p>
@@ -8259,7 +8259,7 @@
           <a:p>
             <a:r>
               <a:rPr lang="es-AR" smtClean="0"/>
-              <a:t>Bases del Diseño de Software - Presentación</a:t>
+              <a:t>Bases del Diseño de Software - SOLID SRP</a:t>
             </a:r>
             <a:endParaRPr lang="es-ES"/>
           </a:p>
@@ -8785,9 +8785,9 @@
           <a:bodyPr/>
           <a:lstStyle/>
           <a:p>
-            <a:fld id="{959037F8-233A-D741-B828-12326F3BAD97}" type="datetime1">
+            <a:fld id="{296259B3-E699-AA48-BE3A-685E12EC266B}" type="datetime1">
               <a:rPr lang="es-AR" smtClean="0"/>
-              <a:t>23/3/15</a:t>
+              <a:t>3/4/15</a:t>
             </a:fld>
             <a:endParaRPr lang="es-ES"/>
           </a:p>
@@ -8810,7 +8810,7 @@
           <a:p>
             <a:r>
               <a:rPr lang="es-AR" smtClean="0"/>
-              <a:t>Bases del Diseño de Software - Presentación</a:t>
+              <a:t>Bases del Diseño de Software - SOLID SRP</a:t>
             </a:r>
             <a:endParaRPr lang="es-ES"/>
           </a:p>
@@ -8908,9 +8908,9 @@
           <a:bodyPr/>
           <a:lstStyle/>
           <a:p>
-            <a:fld id="{2F4C5C29-96D3-F646-8174-B737F81C6B65}" type="datetime1">
+            <a:fld id="{0C280F68-0AF2-D040-91A8-2643B3E437B9}" type="datetime1">
               <a:rPr lang="es-AR" smtClean="0"/>
-              <a:t>23/3/15</a:t>
+              <a:t>3/4/15</a:t>
             </a:fld>
             <a:endParaRPr lang="es-ES"/>
           </a:p>
@@ -8933,7 +8933,7 @@
           <a:p>
             <a:r>
               <a:rPr lang="es-AR" smtClean="0"/>
-              <a:t>Bases del Diseño de Software - Presentación</a:t>
+              <a:t>Bases del Diseño de Software - SOLID SRP</a:t>
             </a:r>
             <a:endParaRPr lang="es-ES"/>
           </a:p>
@@ -10629,9 +10629,9 @@
           <a:bodyPr/>
           <a:lstStyle/>
           <a:p>
-            <a:fld id="{B8B04088-493D-CB4D-9DD6-F1764BF6AD07}" type="datetime1">
+            <a:fld id="{60562A36-FC48-6D4D-982A-C8823A999D67}" type="datetime1">
               <a:rPr lang="es-AR" smtClean="0"/>
-              <a:t>23/3/15</a:t>
+              <a:t>3/4/15</a:t>
             </a:fld>
             <a:endParaRPr lang="es-ES"/>
           </a:p>
@@ -10654,7 +10654,7 @@
           <a:p>
             <a:r>
               <a:rPr lang="es-AR" smtClean="0"/>
-              <a:t>Bases del Diseño de Software - Presentación</a:t>
+              <a:t>Bases del Diseño de Software - SOLID SRP</a:t>
             </a:r>
             <a:endParaRPr lang="es-ES"/>
           </a:p>
@@ -10790,9 +10790,9 @@
           <a:bodyPr/>
           <a:lstStyle/>
           <a:p>
-            <a:fld id="{3E968F70-9886-F648-A26D-227EEF275079}" type="datetime1">
+            <a:fld id="{1FA24F7B-D488-ED4D-93A4-F88147F8F912}" type="datetime1">
               <a:rPr lang="es-AR" smtClean="0"/>
-              <a:t>23/3/15</a:t>
+              <a:t>3/4/15</a:t>
             </a:fld>
             <a:endParaRPr lang="es-ES"/>
           </a:p>
@@ -10815,7 +10815,7 @@
           <a:p>
             <a:r>
               <a:rPr lang="es-AR" smtClean="0"/>
-              <a:t>Bases del Diseño de Software - Presentación</a:t>
+              <a:t>Bases del Diseño de Software - SOLID SRP</a:t>
             </a:r>
             <a:endParaRPr lang="es-ES"/>
           </a:p>
@@ -14415,9 +14415,9 @@
           <a:bodyPr/>
           <a:lstStyle/>
           <a:p>
-            <a:fld id="{93AC3D5E-BE78-B14E-8592-7EA9C42F7C60}" type="datetime1">
+            <a:fld id="{EC4B01E3-0F36-5F4D-BB51-B81F0CF254A4}" type="datetime1">
               <a:rPr lang="es-AR" smtClean="0"/>
-              <a:t>23/3/15</a:t>
+              <a:t>3/4/15</a:t>
             </a:fld>
             <a:endParaRPr lang="es-ES"/>
           </a:p>
@@ -14440,7 +14440,7 @@
           <a:p>
             <a:r>
               <a:rPr lang="es-AR" smtClean="0"/>
-              <a:t>Bases del Diseño de Software - Presentación</a:t>
+              <a:t>Bases del Diseño de Software - SOLID SRP</a:t>
             </a:r>
             <a:endParaRPr lang="es-ES"/>
           </a:p>
@@ -16284,9 +16284,9 @@
             </a:lvl1pPr>
           </a:lstStyle>
           <a:p>
-            <a:fld id="{562CC092-9E89-F84E-B0CC-B6A984562E18}" type="datetime1">
+            <a:fld id="{0EDA3B90-B73D-5849-ABD9-D775A52D037B}" type="datetime1">
               <a:rPr lang="es-AR" smtClean="0"/>
-              <a:t>23/3/15</a:t>
+              <a:t>3/4/15</a:t>
             </a:fld>
             <a:endParaRPr lang="es-ES"/>
           </a:p>
@@ -16325,7 +16325,7 @@
           <a:p>
             <a:r>
               <a:rPr lang="es-ES" smtClean="0"/>
-              <a:t>Bases del Diseño de Software - Presentación</a:t>
+              <a:t>Bases del Diseño de Software - SOLID SRP</a:t>
             </a:r>
             <a:endParaRPr lang="es-ES" dirty="0"/>
           </a:p>
@@ -16454,7 +16454,7 @@
     <p:sldLayoutId id="2147483670" r:id="rId10"/>
     <p:sldLayoutId id="2147483671" r:id="rId11"/>
   </p:sldLayoutIdLst>
-  <p:hf sldNum="0" hdr="0" dt="0"/>
+  <p:hf hdr="0" dt="0"/>
   <p:txStyles>
     <p:titleStyle>
       <a:lvl1pPr algn="ctr" defTabSz="914400" rtl="0" eaLnBrk="1" latinLnBrk="0" hangingPunct="1">
@@ -17041,6 +17041,53 @@
           </a:p>
         </p:txBody>
       </p:sp>
+      <p:sp>
+        <p:nvSpPr>
+          <p:cNvPr id="4" name="Marcador de pie de página 3"/>
+          <p:cNvSpPr>
+            <a:spLocks noGrp="1"/>
+          </p:cNvSpPr>
+          <p:nvPr>
+            <p:ph type="ftr" sz="quarter" idx="11"/>
+          </p:nvPr>
+        </p:nvSpPr>
+        <p:spPr/>
+        <p:txBody>
+          <a:bodyPr/>
+          <a:lstStyle/>
+          <a:p>
+            <a:r>
+              <a:rPr lang="es-AR" smtClean="0"/>
+              <a:t>Bases del Diseño de Software - SOLID SRP</a:t>
+            </a:r>
+            <a:endParaRPr lang="es-ES"/>
+          </a:p>
+        </p:txBody>
+      </p:sp>
+      <p:sp>
+        <p:nvSpPr>
+          <p:cNvPr id="5" name="Marcador de número de diapositiva 4"/>
+          <p:cNvSpPr>
+            <a:spLocks noGrp="1"/>
+          </p:cNvSpPr>
+          <p:nvPr>
+            <p:ph type="sldNum" sz="quarter" idx="12"/>
+          </p:nvPr>
+        </p:nvSpPr>
+        <p:spPr/>
+        <p:txBody>
+          <a:bodyPr/>
+          <a:lstStyle/>
+          <a:p>
+            <a:fld id="{132FADFE-3B8F-471C-ABF0-DBC7717ECBBC}" type="slidenum">
+              <a:rPr lang="es-ES" smtClean="0"/>
+              <a:pPr/>
+              <a:t>10</a:t>
+            </a:fld>
+            <a:endParaRPr lang="es-ES"/>
+          </a:p>
+        </p:txBody>
+      </p:sp>
     </p:spTree>
     <p:extLst>
       <p:ext uri="{BB962C8B-B14F-4D97-AF65-F5344CB8AC3E}">
@@ -17421,6 +17468,53 @@
           </a:extLst>
         </p:spPr>
       </p:pic>
+      <p:sp>
+        <p:nvSpPr>
+          <p:cNvPr id="3" name="Marcador de pie de página 2"/>
+          <p:cNvSpPr>
+            <a:spLocks noGrp="1"/>
+          </p:cNvSpPr>
+          <p:nvPr>
+            <p:ph type="ftr" sz="quarter" idx="11"/>
+          </p:nvPr>
+        </p:nvSpPr>
+        <p:spPr/>
+        <p:txBody>
+          <a:bodyPr/>
+          <a:lstStyle/>
+          <a:p>
+            <a:r>
+              <a:rPr lang="es-AR" smtClean="0"/>
+              <a:t>Bases del Diseño de Software - SOLID SRP</a:t>
+            </a:r>
+            <a:endParaRPr lang="es-ES"/>
+          </a:p>
+        </p:txBody>
+      </p:sp>
+      <p:sp>
+        <p:nvSpPr>
+          <p:cNvPr id="5" name="Marcador de número de diapositiva 4"/>
+          <p:cNvSpPr>
+            <a:spLocks noGrp="1"/>
+          </p:cNvSpPr>
+          <p:nvPr>
+            <p:ph type="sldNum" sz="quarter" idx="12"/>
+          </p:nvPr>
+        </p:nvSpPr>
+        <p:spPr/>
+        <p:txBody>
+          <a:bodyPr/>
+          <a:lstStyle/>
+          <a:p>
+            <a:fld id="{132FADFE-3B8F-471C-ABF0-DBC7717ECBBC}" type="slidenum">
+              <a:rPr lang="es-ES" smtClean="0"/>
+              <a:pPr/>
+              <a:t>11</a:t>
+            </a:fld>
+            <a:endParaRPr lang="es-ES"/>
+          </a:p>
+        </p:txBody>
+      </p:sp>
     </p:spTree>
     <p:extLst>
       <p:ext uri="{BB962C8B-B14F-4D97-AF65-F5344CB8AC3E}">
@@ -17806,6 +17900,53 @@
           </a:extLst>
         </p:spPr>
       </p:pic>
+      <p:sp>
+        <p:nvSpPr>
+          <p:cNvPr id="3" name="Marcador de pie de página 2"/>
+          <p:cNvSpPr>
+            <a:spLocks noGrp="1"/>
+          </p:cNvSpPr>
+          <p:nvPr>
+            <p:ph type="ftr" sz="quarter" idx="11"/>
+          </p:nvPr>
+        </p:nvSpPr>
+        <p:spPr/>
+        <p:txBody>
+          <a:bodyPr/>
+          <a:lstStyle/>
+          <a:p>
+            <a:r>
+              <a:rPr lang="es-AR" smtClean="0"/>
+              <a:t>Bases del Diseño de Software - SOLID SRP</a:t>
+            </a:r>
+            <a:endParaRPr lang="es-ES"/>
+          </a:p>
+        </p:txBody>
+      </p:sp>
+      <p:sp>
+        <p:nvSpPr>
+          <p:cNvPr id="5" name="Marcador de número de diapositiva 4"/>
+          <p:cNvSpPr>
+            <a:spLocks noGrp="1"/>
+          </p:cNvSpPr>
+          <p:nvPr>
+            <p:ph type="sldNum" sz="quarter" idx="12"/>
+          </p:nvPr>
+        </p:nvSpPr>
+        <p:spPr/>
+        <p:txBody>
+          <a:bodyPr/>
+          <a:lstStyle/>
+          <a:p>
+            <a:fld id="{132FADFE-3B8F-471C-ABF0-DBC7717ECBBC}" type="slidenum">
+              <a:rPr lang="es-ES" smtClean="0"/>
+              <a:pPr/>
+              <a:t>12</a:t>
+            </a:fld>
+            <a:endParaRPr lang="es-ES"/>
+          </a:p>
+        </p:txBody>
+      </p:sp>
     </p:spTree>
     <p:extLst>
       <p:ext uri="{BB962C8B-B14F-4D97-AF65-F5344CB8AC3E}">
@@ -17925,6 +18066,53 @@
           </a:extLst>
         </p:spPr>
       </p:pic>
+      <p:sp>
+        <p:nvSpPr>
+          <p:cNvPr id="3" name="Marcador de pie de página 2"/>
+          <p:cNvSpPr>
+            <a:spLocks noGrp="1"/>
+          </p:cNvSpPr>
+          <p:nvPr>
+            <p:ph type="ftr" sz="quarter" idx="11"/>
+          </p:nvPr>
+        </p:nvSpPr>
+        <p:spPr/>
+        <p:txBody>
+          <a:bodyPr/>
+          <a:lstStyle/>
+          <a:p>
+            <a:r>
+              <a:rPr lang="es-AR" smtClean="0"/>
+              <a:t>Bases del Diseño de Software - SOLID SRP</a:t>
+            </a:r>
+            <a:endParaRPr lang="es-ES"/>
+          </a:p>
+        </p:txBody>
+      </p:sp>
+      <p:sp>
+        <p:nvSpPr>
+          <p:cNvPr id="4" name="Marcador de número de diapositiva 3"/>
+          <p:cNvSpPr>
+            <a:spLocks noGrp="1"/>
+          </p:cNvSpPr>
+          <p:nvPr>
+            <p:ph type="sldNum" sz="quarter" idx="12"/>
+          </p:nvPr>
+        </p:nvSpPr>
+        <p:spPr/>
+        <p:txBody>
+          <a:bodyPr/>
+          <a:lstStyle/>
+          <a:p>
+            <a:fld id="{132FADFE-3B8F-471C-ABF0-DBC7717ECBBC}" type="slidenum">
+              <a:rPr lang="es-ES" smtClean="0"/>
+              <a:pPr/>
+              <a:t>13</a:t>
+            </a:fld>
+            <a:endParaRPr lang="es-ES"/>
+          </a:p>
+        </p:txBody>
+      </p:sp>
     </p:spTree>
     <p:extLst>
       <p:ext uri="{BB962C8B-B14F-4D97-AF65-F5344CB8AC3E}">
@@ -18042,6 +18230,53 @@
           </a:extLst>
         </p:spPr>
       </p:pic>
+      <p:sp>
+        <p:nvSpPr>
+          <p:cNvPr id="3" name="Marcador de pie de página 2"/>
+          <p:cNvSpPr>
+            <a:spLocks noGrp="1"/>
+          </p:cNvSpPr>
+          <p:nvPr>
+            <p:ph type="ftr" sz="quarter" idx="11"/>
+          </p:nvPr>
+        </p:nvSpPr>
+        <p:spPr/>
+        <p:txBody>
+          <a:bodyPr/>
+          <a:lstStyle/>
+          <a:p>
+            <a:r>
+              <a:rPr lang="es-AR" smtClean="0"/>
+              <a:t>Bases del Diseño de Software - SOLID SRP</a:t>
+            </a:r>
+            <a:endParaRPr lang="es-ES"/>
+          </a:p>
+        </p:txBody>
+      </p:sp>
+      <p:sp>
+        <p:nvSpPr>
+          <p:cNvPr id="4" name="Marcador de número de diapositiva 3"/>
+          <p:cNvSpPr>
+            <a:spLocks noGrp="1"/>
+          </p:cNvSpPr>
+          <p:nvPr>
+            <p:ph type="sldNum" sz="quarter" idx="12"/>
+          </p:nvPr>
+        </p:nvSpPr>
+        <p:spPr/>
+        <p:txBody>
+          <a:bodyPr/>
+          <a:lstStyle/>
+          <a:p>
+            <a:fld id="{132FADFE-3B8F-471C-ABF0-DBC7717ECBBC}" type="slidenum">
+              <a:rPr lang="es-ES" smtClean="0"/>
+              <a:pPr/>
+              <a:t>14</a:t>
+            </a:fld>
+            <a:endParaRPr lang="es-ES"/>
+          </a:p>
+        </p:txBody>
+      </p:sp>
     </p:spTree>
     <p:extLst>
       <p:ext uri="{BB962C8B-B14F-4D97-AF65-F5344CB8AC3E}">
@@ -18260,6 +18495,53 @@
           </a:extLst>
         </p:spPr>
       </p:pic>
+      <p:sp>
+        <p:nvSpPr>
+          <p:cNvPr id="4" name="Marcador de pie de página 3"/>
+          <p:cNvSpPr>
+            <a:spLocks noGrp="1"/>
+          </p:cNvSpPr>
+          <p:nvPr>
+            <p:ph type="ftr" sz="quarter" idx="11"/>
+          </p:nvPr>
+        </p:nvSpPr>
+        <p:spPr/>
+        <p:txBody>
+          <a:bodyPr/>
+          <a:lstStyle/>
+          <a:p>
+            <a:r>
+              <a:rPr lang="es-AR" smtClean="0"/>
+              <a:t>Bases del Diseño de Software - SOLID SRP</a:t>
+            </a:r>
+            <a:endParaRPr lang="es-ES"/>
+          </a:p>
+        </p:txBody>
+      </p:sp>
+      <p:sp>
+        <p:nvSpPr>
+          <p:cNvPr id="5" name="Marcador de número de diapositiva 4"/>
+          <p:cNvSpPr>
+            <a:spLocks noGrp="1"/>
+          </p:cNvSpPr>
+          <p:nvPr>
+            <p:ph type="sldNum" sz="quarter" idx="12"/>
+          </p:nvPr>
+        </p:nvSpPr>
+        <p:spPr/>
+        <p:txBody>
+          <a:bodyPr/>
+          <a:lstStyle/>
+          <a:p>
+            <a:fld id="{132FADFE-3B8F-471C-ABF0-DBC7717ECBBC}" type="slidenum">
+              <a:rPr lang="es-ES" smtClean="0"/>
+              <a:pPr/>
+              <a:t>15</a:t>
+            </a:fld>
+            <a:endParaRPr lang="es-ES"/>
+          </a:p>
+        </p:txBody>
+      </p:sp>
     </p:spTree>
     <p:extLst>
       <p:ext uri="{BB962C8B-B14F-4D97-AF65-F5344CB8AC3E}">
@@ -18341,6 +18623,53 @@
               <a:t>COHESION</a:t>
             </a:r>
             <a:endParaRPr lang="es-AR" sz="6600" dirty="0"/>
+          </a:p>
+        </p:txBody>
+      </p:sp>
+      <p:sp>
+        <p:nvSpPr>
+          <p:cNvPr id="3" name="Marcador de pie de página 2"/>
+          <p:cNvSpPr>
+            <a:spLocks noGrp="1"/>
+          </p:cNvSpPr>
+          <p:nvPr>
+            <p:ph type="ftr" sz="quarter" idx="11"/>
+          </p:nvPr>
+        </p:nvSpPr>
+        <p:spPr/>
+        <p:txBody>
+          <a:bodyPr/>
+          <a:lstStyle/>
+          <a:p>
+            <a:r>
+              <a:rPr lang="es-AR" smtClean="0"/>
+              <a:t>Bases del Diseño de Software - SOLID SRP</a:t>
+            </a:r>
+            <a:endParaRPr lang="es-ES"/>
+          </a:p>
+        </p:txBody>
+      </p:sp>
+      <p:sp>
+        <p:nvSpPr>
+          <p:cNvPr id="5" name="Marcador de número de diapositiva 4"/>
+          <p:cNvSpPr>
+            <a:spLocks noGrp="1"/>
+          </p:cNvSpPr>
+          <p:nvPr>
+            <p:ph type="sldNum" sz="quarter" idx="12"/>
+          </p:nvPr>
+        </p:nvSpPr>
+        <p:spPr/>
+        <p:txBody>
+          <a:bodyPr/>
+          <a:lstStyle/>
+          <a:p>
+            <a:fld id="{132FADFE-3B8F-471C-ABF0-DBC7717ECBBC}" type="slidenum">
+              <a:rPr lang="es-ES" smtClean="0"/>
+              <a:pPr/>
+              <a:t>16</a:t>
+            </a:fld>
+            <a:endParaRPr lang="es-ES"/>
           </a:p>
         </p:txBody>
       </p:sp>
@@ -18417,6 +18746,53 @@
           </a:extLst>
         </p:spPr>
       </p:pic>
+      <p:sp>
+        <p:nvSpPr>
+          <p:cNvPr id="2" name="Marcador de pie de página 1"/>
+          <p:cNvSpPr>
+            <a:spLocks noGrp="1"/>
+          </p:cNvSpPr>
+          <p:nvPr>
+            <p:ph type="ftr" sz="quarter" idx="11"/>
+          </p:nvPr>
+        </p:nvSpPr>
+        <p:spPr/>
+        <p:txBody>
+          <a:bodyPr/>
+          <a:lstStyle/>
+          <a:p>
+            <a:r>
+              <a:rPr lang="es-AR" smtClean="0"/>
+              <a:t>Bases del Diseño de Software - SOLID SRP</a:t>
+            </a:r>
+            <a:endParaRPr lang="es-ES"/>
+          </a:p>
+        </p:txBody>
+      </p:sp>
+      <p:sp>
+        <p:nvSpPr>
+          <p:cNvPr id="3" name="Marcador de número de diapositiva 2"/>
+          <p:cNvSpPr>
+            <a:spLocks noGrp="1"/>
+          </p:cNvSpPr>
+          <p:nvPr>
+            <p:ph type="sldNum" sz="quarter" idx="12"/>
+          </p:nvPr>
+        </p:nvSpPr>
+        <p:spPr/>
+        <p:txBody>
+          <a:bodyPr/>
+          <a:lstStyle/>
+          <a:p>
+            <a:fld id="{132FADFE-3B8F-471C-ABF0-DBC7717ECBBC}" type="slidenum">
+              <a:rPr lang="es-ES" smtClean="0"/>
+              <a:pPr/>
+              <a:t>2</a:t>
+            </a:fld>
+            <a:endParaRPr lang="es-ES"/>
+          </a:p>
+        </p:txBody>
+      </p:sp>
     </p:spTree>
     <p:extLst>
       <p:ext uri="{BB962C8B-B14F-4D97-AF65-F5344CB8AC3E}">
@@ -18507,6 +18883,53 @@
               <a:t>Que ocurre si hay mala administración de dependencias entre objetos</a:t>
             </a:r>
             <a:endParaRPr lang="es-ES" dirty="0"/>
+          </a:p>
+        </p:txBody>
+      </p:sp>
+      <p:sp>
+        <p:nvSpPr>
+          <p:cNvPr id="4" name="Marcador de pie de página 3"/>
+          <p:cNvSpPr>
+            <a:spLocks noGrp="1"/>
+          </p:cNvSpPr>
+          <p:nvPr>
+            <p:ph type="ftr" sz="quarter" idx="11"/>
+          </p:nvPr>
+        </p:nvSpPr>
+        <p:spPr/>
+        <p:txBody>
+          <a:bodyPr/>
+          <a:lstStyle/>
+          <a:p>
+            <a:r>
+              <a:rPr lang="es-AR" smtClean="0"/>
+              <a:t>Bases del Diseño de Software - SOLID SRP</a:t>
+            </a:r>
+            <a:endParaRPr lang="es-ES"/>
+          </a:p>
+        </p:txBody>
+      </p:sp>
+      <p:sp>
+        <p:nvSpPr>
+          <p:cNvPr id="5" name="Marcador de número de diapositiva 4"/>
+          <p:cNvSpPr>
+            <a:spLocks noGrp="1"/>
+          </p:cNvSpPr>
+          <p:nvPr>
+            <p:ph type="sldNum" sz="quarter" idx="12"/>
+          </p:nvPr>
+        </p:nvSpPr>
+        <p:spPr/>
+        <p:txBody>
+          <a:bodyPr/>
+          <a:lstStyle/>
+          <a:p>
+            <a:fld id="{132FADFE-3B8F-471C-ABF0-DBC7717ECBBC}" type="slidenum">
+              <a:rPr lang="es-ES" smtClean="0"/>
+              <a:pPr/>
+              <a:t>3</a:t>
+            </a:fld>
+            <a:endParaRPr lang="es-ES"/>
           </a:p>
         </p:txBody>
       </p:sp>
@@ -18628,6 +19051,53 @@
           </a:extLst>
         </p:spPr>
       </p:pic>
+      <p:sp>
+        <p:nvSpPr>
+          <p:cNvPr id="4" name="Marcador de pie de página 3"/>
+          <p:cNvSpPr>
+            <a:spLocks noGrp="1"/>
+          </p:cNvSpPr>
+          <p:nvPr>
+            <p:ph type="ftr" sz="quarter" idx="11"/>
+          </p:nvPr>
+        </p:nvSpPr>
+        <p:spPr/>
+        <p:txBody>
+          <a:bodyPr/>
+          <a:lstStyle/>
+          <a:p>
+            <a:r>
+              <a:rPr lang="es-AR" smtClean="0"/>
+              <a:t>Bases del Diseño de Software - SOLID SRP</a:t>
+            </a:r>
+            <a:endParaRPr lang="es-ES"/>
+          </a:p>
+        </p:txBody>
+      </p:sp>
+      <p:sp>
+        <p:nvSpPr>
+          <p:cNvPr id="5" name="Marcador de número de diapositiva 4"/>
+          <p:cNvSpPr>
+            <a:spLocks noGrp="1"/>
+          </p:cNvSpPr>
+          <p:nvPr>
+            <p:ph type="sldNum" sz="quarter" idx="12"/>
+          </p:nvPr>
+        </p:nvSpPr>
+        <p:spPr/>
+        <p:txBody>
+          <a:bodyPr/>
+          <a:lstStyle/>
+          <a:p>
+            <a:fld id="{132FADFE-3B8F-471C-ABF0-DBC7717ECBBC}" type="slidenum">
+              <a:rPr lang="es-ES" smtClean="0"/>
+              <a:pPr/>
+              <a:t>4</a:t>
+            </a:fld>
+            <a:endParaRPr lang="es-ES"/>
+          </a:p>
+        </p:txBody>
+      </p:sp>
     </p:spTree>
     <p:extLst>
       <p:ext uri="{BB962C8B-B14F-4D97-AF65-F5344CB8AC3E}">
@@ -18751,6 +19221,53 @@
           </a:p>
         </p:txBody>
       </p:sp>
+      <p:sp>
+        <p:nvSpPr>
+          <p:cNvPr id="4" name="Marcador de pie de página 3"/>
+          <p:cNvSpPr>
+            <a:spLocks noGrp="1"/>
+          </p:cNvSpPr>
+          <p:nvPr>
+            <p:ph type="ftr" sz="quarter" idx="11"/>
+          </p:nvPr>
+        </p:nvSpPr>
+        <p:spPr/>
+        <p:txBody>
+          <a:bodyPr/>
+          <a:lstStyle/>
+          <a:p>
+            <a:r>
+              <a:rPr lang="es-AR" smtClean="0"/>
+              <a:t>Bases del Diseño de Software - SOLID SRP</a:t>
+            </a:r>
+            <a:endParaRPr lang="es-ES"/>
+          </a:p>
+        </p:txBody>
+      </p:sp>
+      <p:sp>
+        <p:nvSpPr>
+          <p:cNvPr id="5" name="Marcador de número de diapositiva 4"/>
+          <p:cNvSpPr>
+            <a:spLocks noGrp="1"/>
+          </p:cNvSpPr>
+          <p:nvPr>
+            <p:ph type="sldNum" sz="quarter" idx="12"/>
+          </p:nvPr>
+        </p:nvSpPr>
+        <p:spPr/>
+        <p:txBody>
+          <a:bodyPr/>
+          <a:lstStyle/>
+          <a:p>
+            <a:fld id="{132FADFE-3B8F-471C-ABF0-DBC7717ECBBC}" type="slidenum">
+              <a:rPr lang="es-ES" smtClean="0"/>
+              <a:pPr/>
+              <a:t>5</a:t>
+            </a:fld>
+            <a:endParaRPr lang="es-ES"/>
+          </a:p>
+        </p:txBody>
+      </p:sp>
     </p:spTree>
     <p:extLst>
       <p:ext uri="{BB962C8B-B14F-4D97-AF65-F5344CB8AC3E}">
@@ -18853,6 +19370,53 @@
               <a:t>Porque si una clase tiene muchas responsabilidades es muy posible que muchas otras clases dependan de ellas.</a:t>
             </a:r>
             <a:endParaRPr lang="es-ES" dirty="0"/>
+          </a:p>
+        </p:txBody>
+      </p:sp>
+      <p:sp>
+        <p:nvSpPr>
+          <p:cNvPr id="4" name="Marcador de pie de página 3"/>
+          <p:cNvSpPr>
+            <a:spLocks noGrp="1"/>
+          </p:cNvSpPr>
+          <p:nvPr>
+            <p:ph type="ftr" sz="quarter" idx="11"/>
+          </p:nvPr>
+        </p:nvSpPr>
+        <p:spPr/>
+        <p:txBody>
+          <a:bodyPr/>
+          <a:lstStyle/>
+          <a:p>
+            <a:r>
+              <a:rPr lang="es-AR" smtClean="0"/>
+              <a:t>Bases del Diseño de Software - SOLID SRP</a:t>
+            </a:r>
+            <a:endParaRPr lang="es-ES"/>
+          </a:p>
+        </p:txBody>
+      </p:sp>
+      <p:sp>
+        <p:nvSpPr>
+          <p:cNvPr id="5" name="Marcador de número de diapositiva 4"/>
+          <p:cNvSpPr>
+            <a:spLocks noGrp="1"/>
+          </p:cNvSpPr>
+          <p:nvPr>
+            <p:ph type="sldNum" sz="quarter" idx="12"/>
+          </p:nvPr>
+        </p:nvSpPr>
+        <p:spPr/>
+        <p:txBody>
+          <a:bodyPr/>
+          <a:lstStyle/>
+          <a:p>
+            <a:fld id="{132FADFE-3B8F-471C-ABF0-DBC7717ECBBC}" type="slidenum">
+              <a:rPr lang="es-ES" smtClean="0"/>
+              <a:pPr/>
+              <a:t>6</a:t>
+            </a:fld>
+            <a:endParaRPr lang="es-ES"/>
           </a:p>
         </p:txBody>
       </p:sp>
@@ -19301,6 +19865,53 @@
           </a:fontRef>
         </p:style>
       </p:cxnSp>
+      <p:sp>
+        <p:nvSpPr>
+          <p:cNvPr id="3" name="Marcador de pie de página 2"/>
+          <p:cNvSpPr>
+            <a:spLocks noGrp="1"/>
+          </p:cNvSpPr>
+          <p:nvPr>
+            <p:ph type="ftr" sz="quarter" idx="11"/>
+          </p:nvPr>
+        </p:nvSpPr>
+        <p:spPr/>
+        <p:txBody>
+          <a:bodyPr/>
+          <a:lstStyle/>
+          <a:p>
+            <a:r>
+              <a:rPr lang="es-AR" smtClean="0"/>
+              <a:t>Bases del Diseño de Software - SOLID SRP</a:t>
+            </a:r>
+            <a:endParaRPr lang="es-ES"/>
+          </a:p>
+        </p:txBody>
+      </p:sp>
+      <p:sp>
+        <p:nvSpPr>
+          <p:cNvPr id="4" name="Marcador de número de diapositiva 3"/>
+          <p:cNvSpPr>
+            <a:spLocks noGrp="1"/>
+          </p:cNvSpPr>
+          <p:nvPr>
+            <p:ph type="sldNum" sz="quarter" idx="12"/>
+          </p:nvPr>
+        </p:nvSpPr>
+        <p:spPr/>
+        <p:txBody>
+          <a:bodyPr/>
+          <a:lstStyle/>
+          <a:p>
+            <a:fld id="{132FADFE-3B8F-471C-ABF0-DBC7717ECBBC}" type="slidenum">
+              <a:rPr lang="es-ES" smtClean="0"/>
+              <a:pPr/>
+              <a:t>7</a:t>
+            </a:fld>
+            <a:endParaRPr lang="es-ES"/>
+          </a:p>
+        </p:txBody>
+      </p:sp>
     </p:spTree>
     <p:extLst>
       <p:ext uri="{BB962C8B-B14F-4D97-AF65-F5344CB8AC3E}">
@@ -19872,6 +20483,53 @@
           </a:fontRef>
         </p:style>
       </p:cxnSp>
+      <p:sp>
+        <p:nvSpPr>
+          <p:cNvPr id="3" name="Marcador de pie de página 2"/>
+          <p:cNvSpPr>
+            <a:spLocks noGrp="1"/>
+          </p:cNvSpPr>
+          <p:nvPr>
+            <p:ph type="ftr" sz="quarter" idx="11"/>
+          </p:nvPr>
+        </p:nvSpPr>
+        <p:spPr/>
+        <p:txBody>
+          <a:bodyPr/>
+          <a:lstStyle/>
+          <a:p>
+            <a:r>
+              <a:rPr lang="es-AR" smtClean="0"/>
+              <a:t>Bases del Diseño de Software - SOLID SRP</a:t>
+            </a:r>
+            <a:endParaRPr lang="es-ES"/>
+          </a:p>
+        </p:txBody>
+      </p:sp>
+      <p:sp>
+        <p:nvSpPr>
+          <p:cNvPr id="6" name="Marcador de número de diapositiva 5"/>
+          <p:cNvSpPr>
+            <a:spLocks noGrp="1"/>
+          </p:cNvSpPr>
+          <p:nvPr>
+            <p:ph type="sldNum" sz="quarter" idx="12"/>
+          </p:nvPr>
+        </p:nvSpPr>
+        <p:spPr/>
+        <p:txBody>
+          <a:bodyPr/>
+          <a:lstStyle/>
+          <a:p>
+            <a:fld id="{132FADFE-3B8F-471C-ABF0-DBC7717ECBBC}" type="slidenum">
+              <a:rPr lang="es-ES" smtClean="0"/>
+              <a:pPr/>
+              <a:t>8</a:t>
+            </a:fld>
+            <a:endParaRPr lang="es-ES"/>
+          </a:p>
+        </p:txBody>
+      </p:sp>
     </p:spTree>
     <p:extLst>
       <p:ext uri="{BB962C8B-B14F-4D97-AF65-F5344CB8AC3E}">
@@ -20121,6 +20779,53 @@
           <a:p>
             <a:pPr algn="ctr"/>
             <a:endParaRPr lang="es-AR"/>
+          </a:p>
+        </p:txBody>
+      </p:sp>
+      <p:sp>
+        <p:nvSpPr>
+          <p:cNvPr id="8" name="Marcador de pie de página 7"/>
+          <p:cNvSpPr>
+            <a:spLocks noGrp="1"/>
+          </p:cNvSpPr>
+          <p:nvPr>
+            <p:ph type="ftr" sz="quarter" idx="11"/>
+          </p:nvPr>
+        </p:nvSpPr>
+        <p:spPr/>
+        <p:txBody>
+          <a:bodyPr/>
+          <a:lstStyle/>
+          <a:p>
+            <a:r>
+              <a:rPr lang="es-AR" smtClean="0"/>
+              <a:t>Bases del Diseño de Software - SOLID SRP</a:t>
+            </a:r>
+            <a:endParaRPr lang="es-ES"/>
+          </a:p>
+        </p:txBody>
+      </p:sp>
+      <p:sp>
+        <p:nvSpPr>
+          <p:cNvPr id="9" name="Marcador de número de diapositiva 8"/>
+          <p:cNvSpPr>
+            <a:spLocks noGrp="1"/>
+          </p:cNvSpPr>
+          <p:nvPr>
+            <p:ph type="sldNum" sz="quarter" idx="12"/>
+          </p:nvPr>
+        </p:nvSpPr>
+        <p:spPr/>
+        <p:txBody>
+          <a:bodyPr/>
+          <a:lstStyle/>
+          <a:p>
+            <a:fld id="{132FADFE-3B8F-471C-ABF0-DBC7717ECBBC}" type="slidenum">
+              <a:rPr lang="es-ES" smtClean="0"/>
+              <a:pPr/>
+              <a:t>9</a:t>
+            </a:fld>
+            <a:endParaRPr lang="es-ES"/>
           </a:p>
         </p:txBody>
       </p:sp>
@@ -20973,7 +21678,7 @@
   <a:extraClrSchemeLst/>
   <a:extLst>
     <a:ext uri="{05A4C25C-085E-4340-85A3-A5531E510DB2}">
-      <thm15:themeFamily xmlns="" xmlns:thm15="http://schemas.microsoft.com/office/thememl/2012/main" name="Office Theme" id="{62F939B6-93AF-4DB8-9C6B-D6C7DFDC589F}" vid="{4A3C46E8-61CC-4603-A589-7422A47A8E4A}"/>
+      <thm15:themeFamily xmlns:thm15="http://schemas.microsoft.com/office/thememl/2012/main" xmlns="" name="Office Theme" id="{62F939B6-93AF-4DB8-9C6B-D6C7DFDC589F}" vid="{4A3C46E8-61CC-4603-A589-7422A47A8E4A}"/>
     </a:ext>
   </a:extLst>
 </a:theme>

</xml_diff>